<commit_message>
AC5 Engenharia de requisitos e AC4 desenvolvimento de aplicações distribuídas
</commit_message>
<xml_diff>
--- a/08 - Análise das Causas Raizes.pptx
+++ b/08 - Análise das Causas Raizes.pptx
@@ -9,6 +9,7 @@
   </p:notesMasterIdLst>
   <p:sldIdLst>
     <p:sldId id="256" r:id="rId5"/>
+    <p:sldId id="257" r:id="rId6"/>
   </p:sldIdLst>
   <p:sldSz cy="6858000" cx="12192000"/>
   <p:notesSz cx="6858000" cy="9144000"/>
@@ -243,7 +244,7 @@
   </p:defaultTextStyle>
   <p:extLst>
     <p:ext uri="http://customooxmlschemas.google.com/">
-      <go:slidesCustomData xmlns:go="http://customooxmlschemas.google.com/" r:id="rId6" roundtripDataSignature="AMtx7mi3LoZAii6qPD51kZYmZ4U9xWflOw=="/>
+      <go:slidesCustomData xmlns:go="http://customooxmlschemas.google.com/" r:id="rId7" roundtripDataSignature="AMtx7mj/9+oVPDAalJsMAli8acLtdiYL5g=="/>
     </p:ext>
   </p:extLst>
 </p:presentation>
@@ -694,7 +695,7 @@
       </p:grpSpPr>
       <p:sp>
         <p:nvSpPr>
-          <p:cNvPr id="81" name="Google Shape;81;p1:notes"/>
+          <p:cNvPr id="81" name="Google Shape;81;ga8a9506bdf_0_5:notes"/>
           <p:cNvSpPr txBox="1"/>
           <p:nvPr>
             <p:ph idx="1" type="body"/>
@@ -733,7 +734,7 @@
       </p:sp>
       <p:sp>
         <p:nvSpPr>
-          <p:cNvPr id="82" name="Google Shape;82;p1:notes"/>
+          <p:cNvPr id="82" name="Google Shape;82;ga8a9506bdf_0_5:notes"/>
           <p:cNvSpPr/>
           <p:nvPr>
             <p:ph idx="2" type="sldImg"/>
@@ -742,7 +743,106 @@
         <p:spPr>
           <a:xfrm>
             <a:off x="1143225" y="685800"/>
-            <a:ext cx="4572225" cy="3429000"/>
+            <a:ext cx="4572300" cy="3429000"/>
+          </a:xfrm>
+          <a:custGeom>
+            <a:rect b="b" l="l" r="r" t="t"/>
+            <a:pathLst>
+              <a:path extrusionOk="0" h="120000" w="120000">
+                <a:moveTo>
+                  <a:pt x="0" y="0"/>
+                </a:moveTo>
+                <a:lnTo>
+                  <a:pt x="120000" y="0"/>
+                </a:lnTo>
+                <a:lnTo>
+                  <a:pt x="120000" y="120000"/>
+                </a:lnTo>
+                <a:lnTo>
+                  <a:pt x="0" y="120000"/>
+                </a:lnTo>
+                <a:close/>
+              </a:path>
+            </a:pathLst>
+          </a:custGeom>
+        </p:spPr>
+      </p:sp>
+    </p:spTree>
+  </p:cSld>
+  <p:clrMapOvr>
+    <a:masterClrMapping/>
+  </p:clrMapOvr>
+</p:notes>
+</file>
+
+<file path=ppt/notesSlides/notesSlide2.xml><?xml version="1.0" encoding="utf-8"?>
+<p:notes xmlns:a="http://schemas.openxmlformats.org/drawingml/2006/main" xmlns:r="http://schemas.openxmlformats.org/officeDocument/2006/relationships" xmlns:mc="http://schemas.openxmlformats.org/markup-compatibility/2006" xmlns:mv="urn:schemas-microsoft-com:mac:vml" xmlns:p="http://schemas.openxmlformats.org/presentationml/2006/main" xmlns:c="http://schemas.openxmlformats.org/drawingml/2006/chart" xmlns:dgm="http://schemas.openxmlformats.org/drawingml/2006/diagram" xmlns:o="urn:schemas-microsoft-com:office:office" xmlns:v="urn:schemas-microsoft-com:vml" xmlns:pvml="urn:schemas-microsoft-com:office:powerpoint" xmlns:com="http://schemas.openxmlformats.org/drawingml/2006/compatibility" xmlns:p14="http://schemas.microsoft.com/office/powerpoint/2010/main" xmlns:p15="http://schemas.microsoft.com/office/powerpoint/2012/main" xmlns:ahyp="http://schemas.microsoft.com/office/drawing/2018/hyperlinkcolor" showMasterPhAnim="0" showMasterSp="0">
+  <p:cSld>
+    <p:spTree>
+      <p:nvGrpSpPr>
+        <p:cNvPr id="94" name="Shape 94"/>
+        <p:cNvGrpSpPr/>
+        <p:nvPr/>
+      </p:nvGrpSpPr>
+      <p:grpSpPr>
+        <a:xfrm>
+          <a:off x="0" y="0"/>
+          <a:ext cx="0" cy="0"/>
+          <a:chOff x="0" y="0"/>
+          <a:chExt cx="0" cy="0"/>
+        </a:xfrm>
+      </p:grpSpPr>
+      <p:sp>
+        <p:nvSpPr>
+          <p:cNvPr id="95" name="Google Shape;95;ga8a9506bdf_0_18:notes"/>
+          <p:cNvSpPr txBox="1"/>
+          <p:nvPr>
+            <p:ph idx="1" type="body"/>
+          </p:nvPr>
+        </p:nvSpPr>
+        <p:spPr>
+          <a:xfrm>
+            <a:off x="685800" y="4343400"/>
+            <a:ext cx="5486400" cy="4114800"/>
+          </a:xfrm>
+          <a:prstGeom prst="rect">
+            <a:avLst/>
+          </a:prstGeom>
+        </p:spPr>
+        <p:txBody>
+          <a:bodyPr anchorCtr="0" anchor="t" bIns="91425" lIns="91425" spcFirstLastPara="1" rIns="91425" wrap="square" tIns="91425">
+            <a:noAutofit/>
+          </a:bodyPr>
+          <a:lstStyle/>
+          <a:p>
+            <a:pPr indent="0" lvl="0" marL="0" rtl="0" algn="l">
+              <a:spcBef>
+                <a:spcPts val="0"/>
+              </a:spcBef>
+              <a:spcAft>
+                <a:spcPts val="0"/>
+              </a:spcAft>
+              <a:buNone/>
+            </a:pPr>
+            <a:r>
+              <a:t/>
+            </a:r>
+            <a:endParaRPr/>
+          </a:p>
+        </p:txBody>
+      </p:sp>
+      <p:sp>
+        <p:nvSpPr>
+          <p:cNvPr id="96" name="Google Shape;96;ga8a9506bdf_0_18:notes"/>
+          <p:cNvSpPr/>
+          <p:nvPr>
+            <p:ph idx="2" type="sldImg"/>
+          </p:nvPr>
+        </p:nvSpPr>
+        <p:spPr>
+          <a:xfrm>
+            <a:off x="1143225" y="685800"/>
+            <a:ext cx="4572300" cy="3429000"/>
           </a:xfrm>
           <a:custGeom>
             <a:rect b="b" l="l" r="r" t="t"/>
@@ -11033,14 +11133,14 @@
       </p:grpSpPr>
       <p:sp>
         <p:nvSpPr>
-          <p:cNvPr id="84" name="Google Shape;84;p1"/>
+          <p:cNvPr id="84" name="Google Shape;84;ga8a9506bdf_0_5"/>
           <p:cNvSpPr/>
           <p:nvPr/>
         </p:nvSpPr>
         <p:spPr>
           <a:xfrm>
             <a:off x="8560905" y="1683026"/>
-            <a:ext cx="2541380" cy="1908308"/>
+            <a:ext cx="2541300" cy="1908300"/>
           </a:xfrm>
           <a:prstGeom prst="ellipse">
             <a:avLst/>
@@ -11090,14 +11190,14 @@
       </p:sp>
       <p:cxnSp>
         <p:nvCxnSpPr>
-          <p:cNvPr id="85" name="Google Shape;85;p1"/>
+          <p:cNvPr id="85" name="Google Shape;85;ga8a9506bdf_0_5"/>
           <p:cNvCxnSpPr/>
           <p:nvPr/>
         </p:nvCxnSpPr>
         <p:spPr>
           <a:xfrm rot="10800000">
-            <a:off x="967409" y="2782956"/>
-            <a:ext cx="7593495" cy="0"/>
+            <a:off x="967304" y="2782956"/>
+            <a:ext cx="7593600" cy="0"/>
           </a:xfrm>
           <a:prstGeom prst="straightConnector1">
             <a:avLst/>
@@ -11116,14 +11216,14 @@
       </p:cxnSp>
       <p:sp>
         <p:nvSpPr>
-          <p:cNvPr id="86" name="Google Shape;86;p1"/>
+          <p:cNvPr id="86" name="Google Shape;86;ga8a9506bdf_0_5"/>
           <p:cNvSpPr txBox="1"/>
           <p:nvPr/>
         </p:nvSpPr>
         <p:spPr>
           <a:xfrm>
             <a:off x="9246832" y="887896"/>
-            <a:ext cx="1291829" cy="369332"/>
+            <a:ext cx="1291800" cy="369300"/>
           </a:xfrm>
           <a:prstGeom prst="rect">
             <a:avLst/>
@@ -11135,7 +11235,7 @@
         </p:spPr>
         <p:txBody>
           <a:bodyPr anchorCtr="0" anchor="t" bIns="45700" lIns="91425" spcFirstLastPara="1" rIns="91425" wrap="square" tIns="45700">
-            <a:spAutoFit/>
+            <a:noAutofit/>
           </a:bodyPr>
           <a:lstStyle/>
           <a:p>
@@ -11166,14 +11266,14 @@
       </p:sp>
       <p:sp>
         <p:nvSpPr>
-          <p:cNvPr id="87" name="Google Shape;87;p1"/>
+          <p:cNvPr id="87" name="Google Shape;87;ga8a9506bdf_0_5"/>
           <p:cNvSpPr txBox="1"/>
           <p:nvPr/>
         </p:nvSpPr>
         <p:spPr>
           <a:xfrm>
             <a:off x="8995040" y="2218875"/>
-            <a:ext cx="2107244" cy="646331"/>
+            <a:ext cx="2107200" cy="646200"/>
           </a:xfrm>
           <a:prstGeom prst="rect">
             <a:avLst/>
@@ -11185,7 +11285,7 @@
         </p:spPr>
         <p:txBody>
           <a:bodyPr anchorCtr="0" anchor="t" bIns="45700" lIns="91425" spcFirstLastPara="1" rIns="91425" wrap="square" tIns="45700">
-            <a:spAutoFit/>
+            <a:noAutofit/>
           </a:bodyPr>
           <a:lstStyle/>
           <a:p>
@@ -11240,14 +11340,14 @@
       </p:sp>
       <p:cxnSp>
         <p:nvCxnSpPr>
-          <p:cNvPr id="88" name="Google Shape;88;p1"/>
+          <p:cNvPr id="88" name="Google Shape;88;ga8a9506bdf_0_5"/>
           <p:cNvCxnSpPr/>
           <p:nvPr/>
         </p:nvCxnSpPr>
         <p:spPr>
           <a:xfrm rot="10800000">
-            <a:off x="3975651" y="1007164"/>
-            <a:ext cx="1577009" cy="1775792"/>
+            <a:off x="3975560" y="1007256"/>
+            <a:ext cx="1577100" cy="1775700"/>
           </a:xfrm>
           <a:prstGeom prst="straightConnector1">
             <a:avLst/>
@@ -11266,14 +11366,14 @@
       </p:cxnSp>
       <p:cxnSp>
         <p:nvCxnSpPr>
-          <p:cNvPr id="89" name="Google Shape;89;p1"/>
+          <p:cNvPr id="89" name="Google Shape;89;ga8a9506bdf_0_5"/>
           <p:cNvCxnSpPr/>
           <p:nvPr/>
         </p:nvCxnSpPr>
         <p:spPr>
           <a:xfrm flipH="1">
-            <a:off x="6374297" y="2808574"/>
-            <a:ext cx="1457738" cy="2004702"/>
+            <a:off x="6374335" y="2808574"/>
+            <a:ext cx="1457700" cy="2004600"/>
           </a:xfrm>
           <a:prstGeom prst="straightConnector1">
             <a:avLst/>
@@ -11292,14 +11392,14 @@
       </p:cxnSp>
       <p:sp>
         <p:nvSpPr>
-          <p:cNvPr id="90" name="Google Shape;90;p1"/>
+          <p:cNvPr id="90" name="Google Shape;90;ga8a9506bdf_0_5"/>
           <p:cNvSpPr txBox="1"/>
           <p:nvPr/>
         </p:nvSpPr>
         <p:spPr>
           <a:xfrm>
             <a:off x="2824053" y="336443"/>
-            <a:ext cx="2303195" cy="707886"/>
+            <a:ext cx="2303100" cy="708000"/>
           </a:xfrm>
           <a:prstGeom prst="rect">
             <a:avLst/>
@@ -11311,7 +11411,7 @@
         </p:spPr>
         <p:txBody>
           <a:bodyPr anchorCtr="0" anchor="t" bIns="45700" lIns="91425" spcFirstLastPara="1" rIns="91425" wrap="square" tIns="45700">
-            <a:spAutoFit/>
+            <a:noAutofit/>
           </a:bodyPr>
           <a:lstStyle/>
           <a:p>
@@ -11342,14 +11442,14 @@
       </p:sp>
       <p:sp>
         <p:nvSpPr>
-          <p:cNvPr id="91" name="Google Shape;91;p1"/>
+          <p:cNvPr id="91" name="Google Shape;91;ga8a9506bdf_0_5"/>
           <p:cNvSpPr txBox="1"/>
           <p:nvPr/>
         </p:nvSpPr>
         <p:spPr>
           <a:xfrm>
             <a:off x="5061982" y="4980155"/>
-            <a:ext cx="2624629" cy="1015663"/>
+            <a:ext cx="2624700" cy="1015800"/>
           </a:xfrm>
           <a:prstGeom prst="rect">
             <a:avLst/>
@@ -11361,7 +11461,7 @@
         </p:spPr>
         <p:txBody>
           <a:bodyPr anchorCtr="0" anchor="t" bIns="45700" lIns="91425" spcFirstLastPara="1" rIns="91425" wrap="square" tIns="45700">
-            <a:spAutoFit/>
+            <a:noAutofit/>
           </a:bodyPr>
           <a:lstStyle/>
           <a:p>
@@ -11385,6 +11485,611 @@
                 <a:sym typeface="Calibri"/>
               </a:rPr>
               <a:t>Alta demanda de peças.</a:t>
+            </a:r>
+            <a:endParaRPr sz="2000">
+              <a:solidFill>
+                <a:schemeClr val="dk1"/>
+              </a:solidFill>
+              <a:latin typeface="Calibri"/>
+              <a:ea typeface="Calibri"/>
+              <a:cs typeface="Calibri"/>
+              <a:sym typeface="Calibri"/>
+            </a:endParaRPr>
+          </a:p>
+          <a:p>
+            <a:pPr indent="0" lvl="0" marL="0" marR="0" rtl="0" algn="l">
+              <a:spcBef>
+                <a:spcPts val="0"/>
+              </a:spcBef>
+              <a:spcAft>
+                <a:spcPts val="0"/>
+              </a:spcAft>
+              <a:buNone/>
+            </a:pPr>
+            <a:r>
+              <a:t/>
+            </a:r>
+            <a:endParaRPr sz="2000">
+              <a:solidFill>
+                <a:schemeClr val="dk1"/>
+              </a:solidFill>
+              <a:latin typeface="Calibri"/>
+              <a:ea typeface="Calibri"/>
+              <a:cs typeface="Calibri"/>
+              <a:sym typeface="Calibri"/>
+            </a:endParaRPr>
+          </a:p>
+        </p:txBody>
+      </p:sp>
+      <p:cxnSp>
+        <p:nvCxnSpPr>
+          <p:cNvPr id="92" name="Google Shape;92;ga8a9506bdf_0_5"/>
+          <p:cNvCxnSpPr/>
+          <p:nvPr/>
+        </p:nvCxnSpPr>
+        <p:spPr>
+          <a:xfrm flipH="1">
+            <a:off x="1668310" y="2782949"/>
+            <a:ext cx="1457700" cy="2004600"/>
+          </a:xfrm>
+          <a:prstGeom prst="straightConnector1">
+            <a:avLst/>
+          </a:prstGeom>
+          <a:noFill/>
+          <a:ln cap="flat" cmpd="sng" w="9525">
+            <a:solidFill>
+              <a:schemeClr val="accent1"/>
+            </a:solidFill>
+            <a:prstDash val="solid"/>
+            <a:miter lim="800000"/>
+            <a:headEnd len="sm" w="sm" type="none"/>
+            <a:tailEnd len="sm" w="sm" type="none"/>
+          </a:ln>
+        </p:spPr>
+      </p:cxnSp>
+      <p:sp>
+        <p:nvSpPr>
+          <p:cNvPr id="93" name="Google Shape;93;ga8a9506bdf_0_5"/>
+          <p:cNvSpPr txBox="1"/>
+          <p:nvPr/>
+        </p:nvSpPr>
+        <p:spPr>
+          <a:xfrm>
+            <a:off x="355957" y="4813180"/>
+            <a:ext cx="2624700" cy="1015800"/>
+          </a:xfrm>
+          <a:prstGeom prst="rect">
+            <a:avLst/>
+          </a:prstGeom>
+          <a:noFill/>
+          <a:ln>
+            <a:noFill/>
+          </a:ln>
+        </p:spPr>
+        <p:txBody>
+          <a:bodyPr anchorCtr="0" anchor="t" bIns="45700" lIns="91425" spcFirstLastPara="1" rIns="91425" wrap="square" tIns="45700">
+            <a:noAutofit/>
+          </a:bodyPr>
+          <a:lstStyle/>
+          <a:p>
+            <a:pPr indent="0" lvl="0" marL="0" marR="0" rtl="0" algn="l">
+              <a:spcBef>
+                <a:spcPts val="0"/>
+              </a:spcBef>
+              <a:spcAft>
+                <a:spcPts val="0"/>
+              </a:spcAft>
+              <a:buNone/>
+            </a:pPr>
+            <a:r>
+              <a:rPr lang="pt-BR" sz="2000">
+                <a:solidFill>
+                  <a:schemeClr val="dk1"/>
+                </a:solidFill>
+                <a:latin typeface="Calibri"/>
+                <a:ea typeface="Calibri"/>
+                <a:cs typeface="Calibri"/>
+                <a:sym typeface="Calibri"/>
+              </a:rPr>
+              <a:t>Falta de padrões.</a:t>
+            </a:r>
+            <a:endParaRPr sz="2000">
+              <a:solidFill>
+                <a:schemeClr val="dk1"/>
+              </a:solidFill>
+              <a:latin typeface="Calibri"/>
+              <a:ea typeface="Calibri"/>
+              <a:cs typeface="Calibri"/>
+              <a:sym typeface="Calibri"/>
+            </a:endParaRPr>
+          </a:p>
+          <a:p>
+            <a:pPr indent="0" lvl="0" marL="0" marR="0" rtl="0" algn="l">
+              <a:spcBef>
+                <a:spcPts val="0"/>
+              </a:spcBef>
+              <a:spcAft>
+                <a:spcPts val="0"/>
+              </a:spcAft>
+              <a:buNone/>
+            </a:pPr>
+            <a:r>
+              <a:t/>
+            </a:r>
+            <a:endParaRPr sz="2000">
+              <a:solidFill>
+                <a:schemeClr val="dk1"/>
+              </a:solidFill>
+              <a:latin typeface="Calibri"/>
+              <a:ea typeface="Calibri"/>
+              <a:cs typeface="Calibri"/>
+              <a:sym typeface="Calibri"/>
+            </a:endParaRPr>
+          </a:p>
+        </p:txBody>
+      </p:sp>
+    </p:spTree>
+  </p:cSld>
+  <p:clrMapOvr>
+    <a:masterClrMapping/>
+  </p:clrMapOvr>
+</p:sld>
+</file>
+
+<file path=ppt/slides/slide2.xml><?xml version="1.0" encoding="utf-8"?>
+<p:sld xmlns:a="http://schemas.openxmlformats.org/drawingml/2006/main" xmlns:r="http://schemas.openxmlformats.org/officeDocument/2006/relationships" xmlns:mc="http://schemas.openxmlformats.org/markup-compatibility/2006" xmlns:mv="urn:schemas-microsoft-com:mac:vml" xmlns:p="http://schemas.openxmlformats.org/presentationml/2006/main" xmlns:c="http://schemas.openxmlformats.org/drawingml/2006/chart" xmlns:dgm="http://schemas.openxmlformats.org/drawingml/2006/diagram" xmlns:o="urn:schemas-microsoft-com:office:office" xmlns:v="urn:schemas-microsoft-com:vml" xmlns:pvml="urn:schemas-microsoft-com:office:powerpoint" xmlns:com="http://schemas.openxmlformats.org/drawingml/2006/compatibility" xmlns:p14="http://schemas.microsoft.com/office/powerpoint/2010/main" xmlns:p15="http://schemas.microsoft.com/office/powerpoint/2012/main" xmlns:ahyp="http://schemas.microsoft.com/office/drawing/2018/hyperlinkcolor">
+  <p:cSld>
+    <p:spTree>
+      <p:nvGrpSpPr>
+        <p:cNvPr id="97" name="Shape 97"/>
+        <p:cNvGrpSpPr/>
+        <p:nvPr/>
+      </p:nvGrpSpPr>
+      <p:grpSpPr>
+        <a:xfrm>
+          <a:off x="0" y="0"/>
+          <a:ext cx="0" cy="0"/>
+          <a:chOff x="0" y="0"/>
+          <a:chExt cx="0" cy="0"/>
+        </a:xfrm>
+      </p:grpSpPr>
+      <p:sp>
+        <p:nvSpPr>
+          <p:cNvPr id="98" name="Google Shape;98;ga8a9506bdf_0_18"/>
+          <p:cNvSpPr/>
+          <p:nvPr/>
+        </p:nvSpPr>
+        <p:spPr>
+          <a:xfrm>
+            <a:off x="8560905" y="1683026"/>
+            <a:ext cx="2541300" cy="1908300"/>
+          </a:xfrm>
+          <a:prstGeom prst="ellipse">
+            <a:avLst/>
+          </a:prstGeom>
+          <a:solidFill>
+            <a:schemeClr val="accent1"/>
+          </a:solidFill>
+          <a:ln cap="flat" cmpd="sng" w="12700">
+            <a:solidFill>
+              <a:srgbClr val="31538F"/>
+            </a:solidFill>
+            <a:prstDash val="solid"/>
+            <a:miter lim="800000"/>
+            <a:headEnd len="sm" w="sm" type="none"/>
+            <a:tailEnd len="sm" w="sm" type="none"/>
+          </a:ln>
+        </p:spPr>
+        <p:txBody>
+          <a:bodyPr anchorCtr="0" anchor="ctr" bIns="45700" lIns="91425" spcFirstLastPara="1" rIns="91425" wrap="square" tIns="45700">
+            <a:noAutofit/>
+          </a:bodyPr>
+          <a:lstStyle/>
+          <a:p>
+            <a:pPr indent="0" lvl="0" marL="0" marR="0" rtl="0" algn="ctr">
+              <a:spcBef>
+                <a:spcPts val="0"/>
+              </a:spcBef>
+              <a:spcAft>
+                <a:spcPts val="0"/>
+              </a:spcAft>
+              <a:buNone/>
+            </a:pPr>
+            <a:r>
+              <a:t/>
+            </a:r>
+            <a:endParaRPr b="0" i="0" sz="1800" u="none" cap="none" strike="noStrike">
+              <a:solidFill>
+                <a:schemeClr val="lt1"/>
+              </a:solidFill>
+              <a:latin typeface="Calibri"/>
+              <a:ea typeface="Calibri"/>
+              <a:cs typeface="Calibri"/>
+              <a:sym typeface="Calibri"/>
+            </a:endParaRPr>
+          </a:p>
+        </p:txBody>
+      </p:sp>
+      <p:cxnSp>
+        <p:nvCxnSpPr>
+          <p:cNvPr id="99" name="Google Shape;99;ga8a9506bdf_0_18"/>
+          <p:cNvCxnSpPr/>
+          <p:nvPr/>
+        </p:nvCxnSpPr>
+        <p:spPr>
+          <a:xfrm rot="10800000">
+            <a:off x="967304" y="2782956"/>
+            <a:ext cx="7593600" cy="0"/>
+          </a:xfrm>
+          <a:prstGeom prst="straightConnector1">
+            <a:avLst/>
+          </a:prstGeom>
+          <a:noFill/>
+          <a:ln cap="flat" cmpd="sng" w="9525">
+            <a:solidFill>
+              <a:schemeClr val="accent1"/>
+            </a:solidFill>
+            <a:prstDash val="solid"/>
+            <a:miter lim="800000"/>
+            <a:headEnd len="sm" w="sm" type="none"/>
+            <a:tailEnd len="sm" w="sm" type="none"/>
+          </a:ln>
+        </p:spPr>
+      </p:cxnSp>
+      <p:sp>
+        <p:nvSpPr>
+          <p:cNvPr id="100" name="Google Shape;100;ga8a9506bdf_0_18"/>
+          <p:cNvSpPr txBox="1"/>
+          <p:nvPr/>
+        </p:nvSpPr>
+        <p:spPr>
+          <a:xfrm>
+            <a:off x="9246832" y="887896"/>
+            <a:ext cx="1291800" cy="369300"/>
+          </a:xfrm>
+          <a:prstGeom prst="rect">
+            <a:avLst/>
+          </a:prstGeom>
+          <a:noFill/>
+          <a:ln>
+            <a:noFill/>
+          </a:ln>
+        </p:spPr>
+        <p:txBody>
+          <a:bodyPr anchorCtr="0" anchor="t" bIns="45700" lIns="91425" spcFirstLastPara="1" rIns="91425" wrap="square" tIns="45700">
+            <a:noAutofit/>
+          </a:bodyPr>
+          <a:lstStyle/>
+          <a:p>
+            <a:pPr indent="0" lvl="0" marL="0" marR="0" rtl="0" algn="l">
+              <a:spcBef>
+                <a:spcPts val="0"/>
+              </a:spcBef>
+              <a:spcAft>
+                <a:spcPts val="0"/>
+              </a:spcAft>
+              <a:buNone/>
+            </a:pPr>
+            <a:r>
+              <a:rPr b="0" i="0" lang="pt-BR" sz="1800" u="none" cap="none" strike="noStrike">
+                <a:solidFill>
+                  <a:schemeClr val="dk1"/>
+                </a:solidFill>
+                <a:latin typeface="Calibri"/>
+                <a:ea typeface="Calibri"/>
+                <a:cs typeface="Calibri"/>
+                <a:sym typeface="Calibri"/>
+              </a:rPr>
+              <a:t>O Problema</a:t>
+            </a:r>
+            <a:endParaRPr/>
+          </a:p>
+        </p:txBody>
+      </p:sp>
+      <p:sp>
+        <p:nvSpPr>
+          <p:cNvPr id="101" name="Google Shape;101;ga8a9506bdf_0_18"/>
+          <p:cNvSpPr txBox="1"/>
+          <p:nvPr/>
+        </p:nvSpPr>
+        <p:spPr>
+          <a:xfrm>
+            <a:off x="8926690" y="2136750"/>
+            <a:ext cx="2107200" cy="646200"/>
+          </a:xfrm>
+          <a:prstGeom prst="rect">
+            <a:avLst/>
+          </a:prstGeom>
+          <a:noFill/>
+          <a:ln>
+            <a:noFill/>
+          </a:ln>
+        </p:spPr>
+        <p:txBody>
+          <a:bodyPr anchorCtr="0" anchor="t" bIns="45700" lIns="91425" spcFirstLastPara="1" rIns="91425" wrap="square" tIns="45700">
+            <a:noAutofit/>
+          </a:bodyPr>
+          <a:lstStyle/>
+          <a:p>
+            <a:pPr indent="0" lvl="0" marL="0" marR="0" rtl="0" algn="l">
+              <a:spcBef>
+                <a:spcPts val="0"/>
+              </a:spcBef>
+              <a:spcAft>
+                <a:spcPts val="0"/>
+              </a:spcAft>
+              <a:buNone/>
+            </a:pPr>
+            <a:r>
+              <a:rPr lang="pt-BR" sz="1800">
+                <a:solidFill>
+                  <a:schemeClr val="lt2"/>
+                </a:solidFill>
+                <a:latin typeface="Calibri"/>
+                <a:ea typeface="Calibri"/>
+                <a:cs typeface="Calibri"/>
+                <a:sym typeface="Calibri"/>
+              </a:rPr>
+              <a:t>Não ter grande visibilidade na região que atua</a:t>
+            </a:r>
+            <a:endParaRPr/>
+          </a:p>
+        </p:txBody>
+      </p:sp>
+      <p:cxnSp>
+        <p:nvCxnSpPr>
+          <p:cNvPr id="102" name="Google Shape;102;ga8a9506bdf_0_18"/>
+          <p:cNvCxnSpPr/>
+          <p:nvPr/>
+        </p:nvCxnSpPr>
+        <p:spPr>
+          <a:xfrm rot="10800000">
+            <a:off x="3975560" y="1007256"/>
+            <a:ext cx="1577100" cy="1775700"/>
+          </a:xfrm>
+          <a:prstGeom prst="straightConnector1">
+            <a:avLst/>
+          </a:prstGeom>
+          <a:noFill/>
+          <a:ln cap="flat" cmpd="sng" w="9525">
+            <a:solidFill>
+              <a:schemeClr val="accent1"/>
+            </a:solidFill>
+            <a:prstDash val="solid"/>
+            <a:miter lim="800000"/>
+            <a:headEnd len="sm" w="sm" type="none"/>
+            <a:tailEnd len="sm" w="sm" type="none"/>
+          </a:ln>
+        </p:spPr>
+      </p:cxnSp>
+      <p:cxnSp>
+        <p:nvCxnSpPr>
+          <p:cNvPr id="103" name="Google Shape;103;ga8a9506bdf_0_18"/>
+          <p:cNvCxnSpPr/>
+          <p:nvPr/>
+        </p:nvCxnSpPr>
+        <p:spPr>
+          <a:xfrm flipH="1">
+            <a:off x="6374325" y="2782950"/>
+            <a:ext cx="1457700" cy="2020800"/>
+          </a:xfrm>
+          <a:prstGeom prst="straightConnector1">
+            <a:avLst/>
+          </a:prstGeom>
+          <a:noFill/>
+          <a:ln cap="flat" cmpd="sng" w="9525">
+            <a:solidFill>
+              <a:schemeClr val="accent1"/>
+            </a:solidFill>
+            <a:prstDash val="solid"/>
+            <a:miter lim="800000"/>
+            <a:headEnd len="sm" w="sm" type="none"/>
+            <a:tailEnd len="sm" w="sm" type="none"/>
+          </a:ln>
+        </p:spPr>
+      </p:cxnSp>
+      <p:sp>
+        <p:nvSpPr>
+          <p:cNvPr id="104" name="Google Shape;104;ga8a9506bdf_0_18"/>
+          <p:cNvSpPr txBox="1"/>
+          <p:nvPr/>
+        </p:nvSpPr>
+        <p:spPr>
+          <a:xfrm>
+            <a:off x="2824053" y="336443"/>
+            <a:ext cx="2303100" cy="708000"/>
+          </a:xfrm>
+          <a:prstGeom prst="rect">
+            <a:avLst/>
+          </a:prstGeom>
+          <a:noFill/>
+          <a:ln>
+            <a:noFill/>
+          </a:ln>
+        </p:spPr>
+        <p:txBody>
+          <a:bodyPr anchorCtr="0" anchor="t" bIns="45700" lIns="91425" spcFirstLastPara="1" rIns="91425" wrap="square" tIns="45700">
+            <a:noAutofit/>
+          </a:bodyPr>
+          <a:lstStyle/>
+          <a:p>
+            <a:pPr indent="0" lvl="0" marL="0" marR="0" rtl="0" algn="l">
+              <a:spcBef>
+                <a:spcPts val="0"/>
+              </a:spcBef>
+              <a:spcAft>
+                <a:spcPts val="0"/>
+              </a:spcAft>
+              <a:buNone/>
+            </a:pPr>
+            <a:r>
+              <a:rPr lang="pt-BR" sz="2000">
+                <a:solidFill>
+                  <a:schemeClr val="dk1"/>
+                </a:solidFill>
+                <a:latin typeface="Calibri"/>
+                <a:ea typeface="Calibri"/>
+                <a:cs typeface="Calibri"/>
+                <a:sym typeface="Calibri"/>
+              </a:rPr>
+              <a:t>baixa exposição do negócio na internet.</a:t>
+            </a:r>
+            <a:endParaRPr/>
+          </a:p>
+        </p:txBody>
+      </p:sp>
+      <p:sp>
+        <p:nvSpPr>
+          <p:cNvPr id="105" name="Google Shape;105;ga8a9506bdf_0_18"/>
+          <p:cNvSpPr txBox="1"/>
+          <p:nvPr/>
+        </p:nvSpPr>
+        <p:spPr>
+          <a:xfrm>
+            <a:off x="5061973" y="4971985"/>
+            <a:ext cx="2624700" cy="1023900"/>
+          </a:xfrm>
+          <a:prstGeom prst="rect">
+            <a:avLst/>
+          </a:prstGeom>
+          <a:noFill/>
+          <a:ln>
+            <a:noFill/>
+          </a:ln>
+        </p:spPr>
+        <p:txBody>
+          <a:bodyPr anchorCtr="0" anchor="t" bIns="45700" lIns="91425" spcFirstLastPara="1" rIns="91425" wrap="square" tIns="45700">
+            <a:noAutofit/>
+          </a:bodyPr>
+          <a:lstStyle/>
+          <a:p>
+            <a:pPr indent="0" lvl="0" marL="0" marR="0" rtl="0" algn="l">
+              <a:spcBef>
+                <a:spcPts val="0"/>
+              </a:spcBef>
+              <a:spcAft>
+                <a:spcPts val="0"/>
+              </a:spcAft>
+              <a:buNone/>
+            </a:pPr>
+            <a:r>
+              <a:rPr lang="pt-BR" sz="2000">
+                <a:solidFill>
+                  <a:schemeClr val="dk1"/>
+                </a:solidFill>
+                <a:latin typeface="Calibri"/>
+                <a:ea typeface="Calibri"/>
+                <a:cs typeface="Calibri"/>
+                <a:sym typeface="Calibri"/>
+              </a:rPr>
+              <a:t>falta de anúncios.</a:t>
+            </a:r>
+            <a:endParaRPr sz="2000">
+              <a:solidFill>
+                <a:schemeClr val="dk1"/>
+              </a:solidFill>
+              <a:latin typeface="Calibri"/>
+              <a:ea typeface="Calibri"/>
+              <a:cs typeface="Calibri"/>
+              <a:sym typeface="Calibri"/>
+            </a:endParaRPr>
+          </a:p>
+          <a:p>
+            <a:pPr indent="0" lvl="0" marL="0" marR="0" rtl="0" algn="l">
+              <a:spcBef>
+                <a:spcPts val="0"/>
+              </a:spcBef>
+              <a:spcAft>
+                <a:spcPts val="0"/>
+              </a:spcAft>
+              <a:buNone/>
+            </a:pPr>
+            <a:r>
+              <a:t/>
+            </a:r>
+            <a:endParaRPr sz="2000">
+              <a:solidFill>
+                <a:schemeClr val="dk1"/>
+              </a:solidFill>
+              <a:latin typeface="Calibri"/>
+              <a:ea typeface="Calibri"/>
+              <a:cs typeface="Calibri"/>
+              <a:sym typeface="Calibri"/>
+            </a:endParaRPr>
+          </a:p>
+        </p:txBody>
+      </p:sp>
+      <p:cxnSp>
+        <p:nvCxnSpPr>
+          <p:cNvPr id="106" name="Google Shape;106;ga8a9506bdf_0_18"/>
+          <p:cNvCxnSpPr/>
+          <p:nvPr/>
+        </p:nvCxnSpPr>
+        <p:spPr>
+          <a:xfrm flipH="1">
+            <a:off x="2456877" y="2782950"/>
+            <a:ext cx="1457700" cy="2020800"/>
+          </a:xfrm>
+          <a:prstGeom prst="straightConnector1">
+            <a:avLst/>
+          </a:prstGeom>
+          <a:noFill/>
+          <a:ln cap="flat" cmpd="sng" w="9525">
+            <a:solidFill>
+              <a:schemeClr val="accent1"/>
+            </a:solidFill>
+            <a:prstDash val="solid"/>
+            <a:miter lim="800000"/>
+            <a:headEnd len="sm" w="sm" type="none"/>
+            <a:tailEnd len="sm" w="sm" type="none"/>
+          </a:ln>
+        </p:spPr>
+      </p:cxnSp>
+      <p:sp>
+        <p:nvSpPr>
+          <p:cNvPr id="107" name="Google Shape;107;ga8a9506bdf_0_18"/>
+          <p:cNvSpPr txBox="1"/>
+          <p:nvPr/>
+        </p:nvSpPr>
+        <p:spPr>
+          <a:xfrm>
+            <a:off x="1350850" y="4971985"/>
+            <a:ext cx="2624700" cy="1023900"/>
+          </a:xfrm>
+          <a:prstGeom prst="rect">
+            <a:avLst/>
+          </a:prstGeom>
+          <a:noFill/>
+          <a:ln>
+            <a:noFill/>
+          </a:ln>
+        </p:spPr>
+        <p:txBody>
+          <a:bodyPr anchorCtr="0" anchor="t" bIns="45700" lIns="91425" spcFirstLastPara="1" rIns="91425" wrap="square" tIns="45700">
+            <a:noAutofit/>
+          </a:bodyPr>
+          <a:lstStyle/>
+          <a:p>
+            <a:pPr indent="0" lvl="0" marL="0" marR="0" rtl="0" algn="l">
+              <a:spcBef>
+                <a:spcPts val="0"/>
+              </a:spcBef>
+              <a:spcAft>
+                <a:spcPts val="0"/>
+              </a:spcAft>
+              <a:buNone/>
+            </a:pPr>
+            <a:r>
+              <a:rPr lang="pt-BR" sz="2000">
+                <a:solidFill>
+                  <a:schemeClr val="dk1"/>
+                </a:solidFill>
+                <a:latin typeface="Calibri"/>
+                <a:ea typeface="Calibri"/>
+                <a:cs typeface="Calibri"/>
+                <a:sym typeface="Calibri"/>
+              </a:rPr>
+              <a:t>baixa prospecção de novos clientes</a:t>
             </a:r>
             <a:endParaRPr sz="2000">
               <a:solidFill>
@@ -11430,6 +12135,285 @@
 </file>
 
 <file path=ppt/theme/theme1.xml><?xml version="1.0" encoding="utf-8"?>
+<a:theme xmlns:a="http://schemas.openxmlformats.org/drawingml/2006/main" xmlns:r="http://schemas.openxmlformats.org/officeDocument/2006/relationships" name="Tema do Office">
+  <a:themeElements>
+    <a:clrScheme name="Office">
+      <a:dk1>
+        <a:srgbClr val="000000"/>
+      </a:dk1>
+      <a:lt1>
+        <a:srgbClr val="FFFFFF"/>
+      </a:lt1>
+      <a:dk2>
+        <a:srgbClr val="44546A"/>
+      </a:dk2>
+      <a:lt2>
+        <a:srgbClr val="E7E6E6"/>
+      </a:lt2>
+      <a:accent1>
+        <a:srgbClr val="4472C4"/>
+      </a:accent1>
+      <a:accent2>
+        <a:srgbClr val="ED7D31"/>
+      </a:accent2>
+      <a:accent3>
+        <a:srgbClr val="A5A5A5"/>
+      </a:accent3>
+      <a:accent4>
+        <a:srgbClr val="FFC000"/>
+      </a:accent4>
+      <a:accent5>
+        <a:srgbClr val="5B9BD5"/>
+      </a:accent5>
+      <a:accent6>
+        <a:srgbClr val="70AD47"/>
+      </a:accent6>
+      <a:hlink>
+        <a:srgbClr val="0563C1"/>
+      </a:hlink>
+      <a:folHlink>
+        <a:srgbClr val="954F72"/>
+      </a:folHlink>
+    </a:clrScheme>
+    <a:fontScheme name="Office">
+      <a:majorFont>
+        <a:latin typeface="Arial"/>
+        <a:ea typeface=""/>
+        <a:cs typeface=""/>
+        <a:font script="Jpan" typeface="ＭＳ Ｐゴシック"/>
+        <a:font script="Hang" typeface="맑은 고딕"/>
+        <a:font script="Hans" typeface="宋体"/>
+        <a:font script="Hant" typeface="新細明體"/>
+        <a:font script="Arab" typeface="Times New Roman"/>
+        <a:font script="Hebr" typeface="Times New Roman"/>
+        <a:font script="Thai" typeface="Angsana New"/>
+        <a:font script="Ethi" typeface="Nyala"/>
+        <a:font script="Beng" typeface="Vrinda"/>
+        <a:font script="Gujr" typeface="Shruti"/>
+        <a:font script="Khmr" typeface="MoolBoran"/>
+        <a:font script="Knda" typeface="Tunga"/>
+        <a:font script="Guru" typeface="Raavi"/>
+        <a:font script="Cans" typeface="Euphemia"/>
+        <a:font script="Cher" typeface="Plantagenet Cherokee"/>
+        <a:font script="Yiii" typeface="Microsoft Yi Baiti"/>
+        <a:font script="Tibt" typeface="Microsoft Himalaya"/>
+        <a:font script="Thaa" typeface="MV Boli"/>
+        <a:font script="Deva" typeface="Mangal"/>
+        <a:font script="Telu" typeface="Gautami"/>
+        <a:font script="Taml" typeface="Latha"/>
+        <a:font script="Syrc" typeface="Estrangelo Edessa"/>
+        <a:font script="Orya" typeface="Kalinga"/>
+        <a:font script="Mlym" typeface="Kartika"/>
+        <a:font script="Laoo" typeface="DokChampa"/>
+        <a:font script="Sinh" typeface="Iskoola Pota"/>
+        <a:font script="Mong" typeface="Mongolian Baiti"/>
+        <a:font script="Viet" typeface="Times New Roman"/>
+        <a:font script="Uigh" typeface="Microsoft Uighur"/>
+        <a:font script="Geor" typeface="Sylfaen"/>
+      </a:majorFont>
+      <a:minorFont>
+        <a:latin typeface="Arial"/>
+        <a:ea typeface=""/>
+        <a:cs typeface=""/>
+        <a:font script="Jpan" typeface="ＭＳ Ｐゴシック"/>
+        <a:font script="Hang" typeface="맑은 고딕"/>
+        <a:font script="Hans" typeface="宋体"/>
+        <a:font script="Hant" typeface="新細明體"/>
+        <a:font script="Arab" typeface="Arial"/>
+        <a:font script="Hebr" typeface="Arial"/>
+        <a:font script="Thai" typeface="Cordia New"/>
+        <a:font script="Ethi" typeface="Nyala"/>
+        <a:font script="Beng" typeface="Vrinda"/>
+        <a:font script="Gujr" typeface="Shruti"/>
+        <a:font script="Khmr" typeface="DaunPenh"/>
+        <a:font script="Knda" typeface="Tunga"/>
+        <a:font script="Guru" typeface="Raavi"/>
+        <a:font script="Cans" typeface="Euphemia"/>
+        <a:font script="Cher" typeface="Plantagenet Cherokee"/>
+        <a:font script="Yiii" typeface="Microsoft Yi Baiti"/>
+        <a:font script="Tibt" typeface="Microsoft Himalaya"/>
+        <a:font script="Thaa" typeface="MV Boli"/>
+        <a:font script="Deva" typeface="Mangal"/>
+        <a:font script="Telu" typeface="Gautami"/>
+        <a:font script="Taml" typeface="Latha"/>
+        <a:font script="Syrc" typeface="Estrangelo Edessa"/>
+        <a:font script="Orya" typeface="Kalinga"/>
+        <a:font script="Mlym" typeface="Kartika"/>
+        <a:font script="Laoo" typeface="DokChampa"/>
+        <a:font script="Sinh" typeface="Iskoola Pota"/>
+        <a:font script="Mong" typeface="Mongolian Baiti"/>
+        <a:font script="Viet" typeface="Arial"/>
+        <a:font script="Uigh" typeface="Microsoft Uighur"/>
+        <a:font script="Geor" typeface="Sylfaen"/>
+      </a:minorFont>
+    </a:fontScheme>
+    <a:fmtScheme name="Office">
+      <a:fillStyleLst>
+        <a:solidFill>
+          <a:schemeClr val="phClr"/>
+        </a:solidFill>
+        <a:gradFill rotWithShape="1">
+          <a:gsLst>
+            <a:gs pos="0">
+              <a:schemeClr val="phClr">
+                <a:tint val="50000"/>
+                <a:satMod val="300000"/>
+              </a:schemeClr>
+            </a:gs>
+            <a:gs pos="35000">
+              <a:schemeClr val="phClr">
+                <a:tint val="37000"/>
+                <a:satMod val="300000"/>
+              </a:schemeClr>
+            </a:gs>
+            <a:gs pos="100000">
+              <a:schemeClr val="phClr">
+                <a:tint val="15000"/>
+                <a:satMod val="350000"/>
+              </a:schemeClr>
+            </a:gs>
+          </a:gsLst>
+          <a:lin ang="16200000" scaled="1"/>
+        </a:gradFill>
+        <a:gradFill rotWithShape="1">
+          <a:gsLst>
+            <a:gs pos="0">
+              <a:schemeClr val="phClr">
+                <a:tint val="100000"/>
+                <a:shade val="100000"/>
+                <a:satMod val="130000"/>
+              </a:schemeClr>
+            </a:gs>
+            <a:gs pos="100000">
+              <a:schemeClr val="phClr">
+                <a:tint val="50000"/>
+                <a:shade val="100000"/>
+                <a:satMod val="350000"/>
+              </a:schemeClr>
+            </a:gs>
+          </a:gsLst>
+          <a:lin ang="16200000" scaled="0"/>
+        </a:gradFill>
+      </a:fillStyleLst>
+      <a:lnStyleLst>
+        <a:ln w="9525" cap="flat" cmpd="sng" algn="ctr">
+          <a:solidFill>
+            <a:schemeClr val="phClr">
+              <a:shade val="95000"/>
+              <a:satMod val="105000"/>
+            </a:schemeClr>
+          </a:solidFill>
+          <a:prstDash val="solid"/>
+        </a:ln>
+        <a:ln w="25400" cap="flat" cmpd="sng" algn="ctr">
+          <a:solidFill>
+            <a:schemeClr val="phClr"/>
+          </a:solidFill>
+          <a:prstDash val="solid"/>
+        </a:ln>
+        <a:ln w="38100" cap="flat" cmpd="sng" algn="ctr">
+          <a:solidFill>
+            <a:schemeClr val="phClr"/>
+          </a:solidFill>
+          <a:prstDash val="solid"/>
+        </a:ln>
+      </a:lnStyleLst>
+      <a:effectStyleLst>
+        <a:effectStyle>
+          <a:effectLst>
+            <a:outerShdw blurRad="40000" dist="20000" dir="5400000" rotWithShape="0">
+              <a:srgbClr val="000000">
+                <a:alpha val="38000"/>
+              </a:srgbClr>
+            </a:outerShdw>
+          </a:effectLst>
+        </a:effectStyle>
+        <a:effectStyle>
+          <a:effectLst>
+            <a:outerShdw blurRad="40000" dist="23000" dir="5400000" rotWithShape="0">
+              <a:srgbClr val="000000">
+                <a:alpha val="35000"/>
+              </a:srgbClr>
+            </a:outerShdw>
+          </a:effectLst>
+        </a:effectStyle>
+        <a:effectStyle>
+          <a:effectLst>
+            <a:outerShdw blurRad="40000" dist="23000" dir="5400000" rotWithShape="0">
+              <a:srgbClr val="000000">
+                <a:alpha val="35000"/>
+              </a:srgbClr>
+            </a:outerShdw>
+          </a:effectLst>
+          <a:scene3d>
+            <a:camera prst="orthographicFront">
+              <a:rot lat="0" lon="0" rev="0"/>
+            </a:camera>
+            <a:lightRig rig="threePt" dir="t">
+              <a:rot lat="0" lon="0" rev="1200000"/>
+            </a:lightRig>
+          </a:scene3d>
+          <a:sp3d>
+            <a:bevelT w="63500" h="25400"/>
+          </a:sp3d>
+        </a:effectStyle>
+      </a:effectStyleLst>
+      <a:bgFillStyleLst>
+        <a:solidFill>
+          <a:schemeClr val="phClr"/>
+        </a:solidFill>
+        <a:gradFill rotWithShape="1">
+          <a:gsLst>
+            <a:gs pos="0">
+              <a:schemeClr val="phClr">
+                <a:tint val="40000"/>
+                <a:satMod val="350000"/>
+              </a:schemeClr>
+            </a:gs>
+            <a:gs pos="40000">
+              <a:schemeClr val="phClr">
+                <a:tint val="45000"/>
+                <a:shade val="99000"/>
+                <a:satMod val="350000"/>
+              </a:schemeClr>
+            </a:gs>
+            <a:gs pos="100000">
+              <a:schemeClr val="phClr">
+                <a:shade val="20000"/>
+                <a:satMod val="255000"/>
+              </a:schemeClr>
+            </a:gs>
+          </a:gsLst>
+          <a:path path="circle">
+            <a:fillToRect l="50000" t="-80000" r="50000" b="180000"/>
+          </a:path>
+        </a:gradFill>
+        <a:gradFill rotWithShape="1">
+          <a:gsLst>
+            <a:gs pos="0">
+              <a:schemeClr val="phClr">
+                <a:tint val="80000"/>
+                <a:satMod val="300000"/>
+              </a:schemeClr>
+            </a:gs>
+            <a:gs pos="100000">
+              <a:schemeClr val="phClr">
+                <a:shade val="30000"/>
+                <a:satMod val="200000"/>
+              </a:schemeClr>
+            </a:gs>
+          </a:gsLst>
+          <a:path path="circle">
+            <a:fillToRect l="50000" t="50000" r="50000" b="50000"/>
+          </a:path>
+        </a:gradFill>
+      </a:bgFillStyleLst>
+    </a:fmtScheme>
+  </a:themeElements>
+</a:theme>
+</file>
+
+<file path=ppt/theme/theme2.xml><?xml version="1.0" encoding="utf-8"?>
 <a:theme xmlns:a="http://schemas.openxmlformats.org/drawingml/2006/main" xmlns:r="http://schemas.openxmlformats.org/officeDocument/2006/relationships">
   <a:themeElements>
     <a:clrScheme name="Default">
@@ -11706,283 +12690,4 @@
     </a:fmtScheme>
   </a:themeElements>
 </a:theme>
-</file>
-
-<file path=ppt/theme/theme2.xml><?xml version="1.0" encoding="utf-8"?>
-<a:theme xmlns:a="http://schemas.openxmlformats.org/drawingml/2006/main" xmlns:r="http://schemas.openxmlformats.org/officeDocument/2006/relationships" name="Tema do Office">
-  <a:themeElements>
-    <a:clrScheme name="Office">
-      <a:dk1>
-        <a:srgbClr val="000000"/>
-      </a:dk1>
-      <a:lt1>
-        <a:srgbClr val="FFFFFF"/>
-      </a:lt1>
-      <a:dk2>
-        <a:srgbClr val="44546A"/>
-      </a:dk2>
-      <a:lt2>
-        <a:srgbClr val="E7E6E6"/>
-      </a:lt2>
-      <a:accent1>
-        <a:srgbClr val="4472C4"/>
-      </a:accent1>
-      <a:accent2>
-        <a:srgbClr val="ED7D31"/>
-      </a:accent2>
-      <a:accent3>
-        <a:srgbClr val="A5A5A5"/>
-      </a:accent3>
-      <a:accent4>
-        <a:srgbClr val="FFC000"/>
-      </a:accent4>
-      <a:accent5>
-        <a:srgbClr val="5B9BD5"/>
-      </a:accent5>
-      <a:accent6>
-        <a:srgbClr val="70AD47"/>
-      </a:accent6>
-      <a:hlink>
-        <a:srgbClr val="0563C1"/>
-      </a:hlink>
-      <a:folHlink>
-        <a:srgbClr val="954F72"/>
-      </a:folHlink>
-    </a:clrScheme>
-    <a:fontScheme name="Office">
-      <a:majorFont>
-        <a:latin typeface="Arial"/>
-        <a:ea typeface=""/>
-        <a:cs typeface=""/>
-        <a:font script="Jpan" typeface="ＭＳ Ｐゴシック"/>
-        <a:font script="Hang" typeface="맑은 고딕"/>
-        <a:font script="Hans" typeface="宋体"/>
-        <a:font script="Hant" typeface="新細明體"/>
-        <a:font script="Arab" typeface="Times New Roman"/>
-        <a:font script="Hebr" typeface="Times New Roman"/>
-        <a:font script="Thai" typeface="Angsana New"/>
-        <a:font script="Ethi" typeface="Nyala"/>
-        <a:font script="Beng" typeface="Vrinda"/>
-        <a:font script="Gujr" typeface="Shruti"/>
-        <a:font script="Khmr" typeface="MoolBoran"/>
-        <a:font script="Knda" typeface="Tunga"/>
-        <a:font script="Guru" typeface="Raavi"/>
-        <a:font script="Cans" typeface="Euphemia"/>
-        <a:font script="Cher" typeface="Plantagenet Cherokee"/>
-        <a:font script="Yiii" typeface="Microsoft Yi Baiti"/>
-        <a:font script="Tibt" typeface="Microsoft Himalaya"/>
-        <a:font script="Thaa" typeface="MV Boli"/>
-        <a:font script="Deva" typeface="Mangal"/>
-        <a:font script="Telu" typeface="Gautami"/>
-        <a:font script="Taml" typeface="Latha"/>
-        <a:font script="Syrc" typeface="Estrangelo Edessa"/>
-        <a:font script="Orya" typeface="Kalinga"/>
-        <a:font script="Mlym" typeface="Kartika"/>
-        <a:font script="Laoo" typeface="DokChampa"/>
-        <a:font script="Sinh" typeface="Iskoola Pota"/>
-        <a:font script="Mong" typeface="Mongolian Baiti"/>
-        <a:font script="Viet" typeface="Times New Roman"/>
-        <a:font script="Uigh" typeface="Microsoft Uighur"/>
-        <a:font script="Geor" typeface="Sylfaen"/>
-      </a:majorFont>
-      <a:minorFont>
-        <a:latin typeface="Arial"/>
-        <a:ea typeface=""/>
-        <a:cs typeface=""/>
-        <a:font script="Jpan" typeface="ＭＳ Ｐゴシック"/>
-        <a:font script="Hang" typeface="맑은 고딕"/>
-        <a:font script="Hans" typeface="宋体"/>
-        <a:font script="Hant" typeface="新細明體"/>
-        <a:font script="Arab" typeface="Arial"/>
-        <a:font script="Hebr" typeface="Arial"/>
-        <a:font script="Thai" typeface="Cordia New"/>
-        <a:font script="Ethi" typeface="Nyala"/>
-        <a:font script="Beng" typeface="Vrinda"/>
-        <a:font script="Gujr" typeface="Shruti"/>
-        <a:font script="Khmr" typeface="DaunPenh"/>
-        <a:font script="Knda" typeface="Tunga"/>
-        <a:font script="Guru" typeface="Raavi"/>
-        <a:font script="Cans" typeface="Euphemia"/>
-        <a:font script="Cher" typeface="Plantagenet Cherokee"/>
-        <a:font script="Yiii" typeface="Microsoft Yi Baiti"/>
-        <a:font script="Tibt" typeface="Microsoft Himalaya"/>
-        <a:font script="Thaa" typeface="MV Boli"/>
-        <a:font script="Deva" typeface="Mangal"/>
-        <a:font script="Telu" typeface="Gautami"/>
-        <a:font script="Taml" typeface="Latha"/>
-        <a:font script="Syrc" typeface="Estrangelo Edessa"/>
-        <a:font script="Orya" typeface="Kalinga"/>
-        <a:font script="Mlym" typeface="Kartika"/>
-        <a:font script="Laoo" typeface="DokChampa"/>
-        <a:font script="Sinh" typeface="Iskoola Pota"/>
-        <a:font script="Mong" typeface="Mongolian Baiti"/>
-        <a:font script="Viet" typeface="Arial"/>
-        <a:font script="Uigh" typeface="Microsoft Uighur"/>
-        <a:font script="Geor" typeface="Sylfaen"/>
-      </a:minorFont>
-    </a:fontScheme>
-    <a:fmtScheme name="Office">
-      <a:fillStyleLst>
-        <a:solidFill>
-          <a:schemeClr val="phClr"/>
-        </a:solidFill>
-        <a:gradFill rotWithShape="1">
-          <a:gsLst>
-            <a:gs pos="0">
-              <a:schemeClr val="phClr">
-                <a:tint val="50000"/>
-                <a:satMod val="300000"/>
-              </a:schemeClr>
-            </a:gs>
-            <a:gs pos="35000">
-              <a:schemeClr val="phClr">
-                <a:tint val="37000"/>
-                <a:satMod val="300000"/>
-              </a:schemeClr>
-            </a:gs>
-            <a:gs pos="100000">
-              <a:schemeClr val="phClr">
-                <a:tint val="15000"/>
-                <a:satMod val="350000"/>
-              </a:schemeClr>
-            </a:gs>
-          </a:gsLst>
-          <a:lin ang="16200000" scaled="1"/>
-        </a:gradFill>
-        <a:gradFill rotWithShape="1">
-          <a:gsLst>
-            <a:gs pos="0">
-              <a:schemeClr val="phClr">
-                <a:tint val="100000"/>
-                <a:shade val="100000"/>
-                <a:satMod val="130000"/>
-              </a:schemeClr>
-            </a:gs>
-            <a:gs pos="100000">
-              <a:schemeClr val="phClr">
-                <a:tint val="50000"/>
-                <a:shade val="100000"/>
-                <a:satMod val="350000"/>
-              </a:schemeClr>
-            </a:gs>
-          </a:gsLst>
-          <a:lin ang="16200000" scaled="0"/>
-        </a:gradFill>
-      </a:fillStyleLst>
-      <a:lnStyleLst>
-        <a:ln w="9525" cap="flat" cmpd="sng" algn="ctr">
-          <a:solidFill>
-            <a:schemeClr val="phClr">
-              <a:shade val="95000"/>
-              <a:satMod val="105000"/>
-            </a:schemeClr>
-          </a:solidFill>
-          <a:prstDash val="solid"/>
-        </a:ln>
-        <a:ln w="25400" cap="flat" cmpd="sng" algn="ctr">
-          <a:solidFill>
-            <a:schemeClr val="phClr"/>
-          </a:solidFill>
-          <a:prstDash val="solid"/>
-        </a:ln>
-        <a:ln w="38100" cap="flat" cmpd="sng" algn="ctr">
-          <a:solidFill>
-            <a:schemeClr val="phClr"/>
-          </a:solidFill>
-          <a:prstDash val="solid"/>
-        </a:ln>
-      </a:lnStyleLst>
-      <a:effectStyleLst>
-        <a:effectStyle>
-          <a:effectLst>
-            <a:outerShdw blurRad="40000" dist="20000" dir="5400000" rotWithShape="0">
-              <a:srgbClr val="000000">
-                <a:alpha val="38000"/>
-              </a:srgbClr>
-            </a:outerShdw>
-          </a:effectLst>
-        </a:effectStyle>
-        <a:effectStyle>
-          <a:effectLst>
-            <a:outerShdw blurRad="40000" dist="23000" dir="5400000" rotWithShape="0">
-              <a:srgbClr val="000000">
-                <a:alpha val="35000"/>
-              </a:srgbClr>
-            </a:outerShdw>
-          </a:effectLst>
-        </a:effectStyle>
-        <a:effectStyle>
-          <a:effectLst>
-            <a:outerShdw blurRad="40000" dist="23000" dir="5400000" rotWithShape="0">
-              <a:srgbClr val="000000">
-                <a:alpha val="35000"/>
-              </a:srgbClr>
-            </a:outerShdw>
-          </a:effectLst>
-          <a:scene3d>
-            <a:camera prst="orthographicFront">
-              <a:rot lat="0" lon="0" rev="0"/>
-            </a:camera>
-            <a:lightRig rig="threePt" dir="t">
-              <a:rot lat="0" lon="0" rev="1200000"/>
-            </a:lightRig>
-          </a:scene3d>
-          <a:sp3d>
-            <a:bevelT w="63500" h="25400"/>
-          </a:sp3d>
-        </a:effectStyle>
-      </a:effectStyleLst>
-      <a:bgFillStyleLst>
-        <a:solidFill>
-          <a:schemeClr val="phClr"/>
-        </a:solidFill>
-        <a:gradFill rotWithShape="1">
-          <a:gsLst>
-            <a:gs pos="0">
-              <a:schemeClr val="phClr">
-                <a:tint val="40000"/>
-                <a:satMod val="350000"/>
-              </a:schemeClr>
-            </a:gs>
-            <a:gs pos="40000">
-              <a:schemeClr val="phClr">
-                <a:tint val="45000"/>
-                <a:shade val="99000"/>
-                <a:satMod val="350000"/>
-              </a:schemeClr>
-            </a:gs>
-            <a:gs pos="100000">
-              <a:schemeClr val="phClr">
-                <a:shade val="20000"/>
-                <a:satMod val="255000"/>
-              </a:schemeClr>
-            </a:gs>
-          </a:gsLst>
-          <a:path path="circle">
-            <a:fillToRect l="50000" t="-80000" r="50000" b="180000"/>
-          </a:path>
-        </a:gradFill>
-        <a:gradFill rotWithShape="1">
-          <a:gsLst>
-            <a:gs pos="0">
-              <a:schemeClr val="phClr">
-                <a:tint val="80000"/>
-                <a:satMod val="300000"/>
-              </a:schemeClr>
-            </a:gs>
-            <a:gs pos="100000">
-              <a:schemeClr val="phClr">
-                <a:shade val="30000"/>
-                <a:satMod val="200000"/>
-              </a:schemeClr>
-            </a:gs>
-          </a:gsLst>
-          <a:path path="circle">
-            <a:fillToRect l="50000" t="50000" r="50000" b="50000"/>
-          </a:path>
-        </a:gradFill>
-      </a:bgFillStyleLst>
-    </a:fmtScheme>
-  </a:themeElements>
-</a:theme>
 </file>
</xml_diff>